<commit_message>
Archivos modificados con la problematica
</commit_message>
<xml_diff>
--- a/PresentacionSensoresAgua.pptx
+++ b/PresentacionSensoresAgua.pptx
@@ -7,6 +7,7 @@
   <p:sldIdLst>
     <p:sldId id="256" r:id="rId2"/>
     <p:sldId id="257" r:id="rId3"/>
+    <p:sldId id="258" r:id="rId4"/>
   </p:sldIdLst>
   <p:sldSz cx="12192000" cy="6858000"/>
   <p:notesSz cx="6858000" cy="9144000"/>
@@ -208,7 +209,7 @@
           <a:effectLst/>
           <a:extLst>
             <a:ext uri="{91240B29-F687-4f45-9708-019B960494DF}">
-              <a14:hiddenLine xmlns:a14="http://schemas.microsoft.com/office/drawing/2010/main" xmlns="" w="9525">
+              <a14:hiddenLine xmlns="" xmlns:a14="http://schemas.microsoft.com/office/drawing/2010/main" w="9525">
                 <a:solidFill>
                   <a:srgbClr val="000000"/>
                 </a:solidFill>
@@ -1730,7 +1731,7 @@
           <a:ln/>
           <a:extLst>
             <a:ext uri="{91240B29-F687-4f45-9708-019B960494DF}">
-              <a14:hiddenLine xmlns:a14="http://schemas.microsoft.com/office/drawing/2010/main" xmlns="" w="9525">
+              <a14:hiddenLine xmlns="" xmlns:a14="http://schemas.microsoft.com/office/drawing/2010/main" w="9525">
                 <a:solidFill>
                   <a:srgbClr val="000000"/>
                 </a:solidFill>
@@ -2005,7 +2006,7 @@
           <a:ln/>
           <a:extLst>
             <a:ext uri="{91240B29-F687-4f45-9708-019B960494DF}">
-              <a14:hiddenLine xmlns:a14="http://schemas.microsoft.com/office/drawing/2010/main" xmlns="" w="9525">
+              <a14:hiddenLine xmlns="" xmlns:a14="http://schemas.microsoft.com/office/drawing/2010/main" w="9525">
                 <a:solidFill>
                   <a:srgbClr val="000000"/>
                 </a:solidFill>
@@ -2288,7 +2289,7 @@
           <a:ln/>
           <a:extLst>
             <a:ext uri="{91240B29-F687-4f45-9708-019B960494DF}">
-              <a14:hiddenLine xmlns:a14="http://schemas.microsoft.com/office/drawing/2010/main" xmlns="" w="9525">
+              <a14:hiddenLine xmlns="" xmlns:a14="http://schemas.microsoft.com/office/drawing/2010/main" w="9525">
                 <a:solidFill>
                   <a:srgbClr val="000000"/>
                 </a:solidFill>
@@ -2914,7 +2915,7 @@
           <a:ln/>
           <a:extLst>
             <a:ext uri="{91240B29-F687-4f45-9708-019B960494DF}">
-              <a14:hiddenLine xmlns:a14="http://schemas.microsoft.com/office/drawing/2010/main" xmlns="" w="9525">
+              <a14:hiddenLine xmlns="" xmlns:a14="http://schemas.microsoft.com/office/drawing/2010/main" w="9525">
                 <a:solidFill>
                   <a:srgbClr val="000000"/>
                 </a:solidFill>
@@ -3253,7 +3254,7 @@
           <a:ln/>
           <a:extLst>
             <a:ext uri="{91240B29-F687-4f45-9708-019B960494DF}">
-              <a14:hiddenLine xmlns:a14="http://schemas.microsoft.com/office/drawing/2010/main" xmlns="" w="9525">
+              <a14:hiddenLine xmlns="" xmlns:a14="http://schemas.microsoft.com/office/drawing/2010/main" w="9525">
                 <a:solidFill>
                   <a:srgbClr val="000000"/>
                 </a:solidFill>
@@ -3730,7 +3731,7 @@
           <a:ln/>
           <a:extLst>
             <a:ext uri="{91240B29-F687-4f45-9708-019B960494DF}">
-              <a14:hiddenLine xmlns:a14="http://schemas.microsoft.com/office/drawing/2010/main" xmlns="" w="9525">
+              <a14:hiddenLine xmlns="" xmlns:a14="http://schemas.microsoft.com/office/drawing/2010/main" w="9525">
                 <a:solidFill>
                   <a:srgbClr val="000000"/>
                 </a:solidFill>
@@ -4159,7 +4160,7 @@
           <a:ln/>
           <a:extLst>
             <a:ext uri="{91240B29-F687-4f45-9708-019B960494DF}">
-              <a14:hiddenLine xmlns:a14="http://schemas.microsoft.com/office/drawing/2010/main" xmlns="" w="9525">
+              <a14:hiddenLine xmlns="" xmlns:a14="http://schemas.microsoft.com/office/drawing/2010/main" w="9525">
                 <a:solidFill>
                   <a:srgbClr val="000000"/>
                 </a:solidFill>
@@ -5406,7 +5407,7 @@
                 <a16:creationId xmlns:a16="http://schemas.microsoft.com/office/drawing/2014/main" id="{54047A07-72EC-41BC-A55F-C264F639FB20}"/>
               </a:ext>
               <a:ext uri="{C183D7F6-B498-43B3-948B-1728B52AA6E4}">
-                <adec:decorative xmlns:adec="http://schemas.microsoft.com/office/drawing/2017/decorative" val="1"/>
+                <adec:decorative xmlns:adec="http://schemas.microsoft.com/office/drawing/2017/decorative" xmlns="" val="1"/>
               </a:ext>
             </a:extLst>
           </p:cNvPr>
@@ -5668,6 +5669,10 @@
             </a:endParaRPr>
           </a:p>
           <a:p>
+            <a:r>
+              <a:rPr lang="es-MX" dirty="0"/>
+              <a:t/>
+            </a:r>
             <a:br>
               <a:rPr lang="es-MX" dirty="0"/>
             </a:br>
@@ -5977,6 +5982,173 @@
     <p:extLst>
       <p:ext uri="{BB962C8B-B14F-4D97-AF65-F5344CB8AC3E}">
         <p14:creationId xmlns:p14="http://schemas.microsoft.com/office/powerpoint/2010/main" val="969365076"/>
+      </p:ext>
+    </p:extLst>
+  </p:cSld>
+  <p:clrMapOvr>
+    <a:masterClrMapping/>
+  </p:clrMapOvr>
+</p:sld>
+</file>
+
+<file path=ppt/slides/slide3.xml><?xml version="1.0" encoding="utf-8"?>
+<p:sld xmlns:a="http://schemas.openxmlformats.org/drawingml/2006/main" xmlns:r="http://schemas.openxmlformats.org/officeDocument/2006/relationships" xmlns:p="http://schemas.openxmlformats.org/presentationml/2006/main">
+  <p:cSld>
+    <p:spTree>
+      <p:nvGrpSpPr>
+        <p:cNvPr id="1" name=""/>
+        <p:cNvGrpSpPr/>
+        <p:nvPr/>
+      </p:nvGrpSpPr>
+      <p:grpSpPr>
+        <a:xfrm>
+          <a:off x="0" y="0"/>
+          <a:ext cx="0" cy="0"/>
+          <a:chOff x="0" y="0"/>
+          <a:chExt cx="0" cy="0"/>
+        </a:xfrm>
+      </p:grpSpPr>
+      <p:sp>
+        <p:nvSpPr>
+          <p:cNvPr id="2" name="Título 1"/>
+          <p:cNvSpPr>
+            <a:spLocks noGrp="1"/>
+          </p:cNvSpPr>
+          <p:nvPr>
+            <p:ph type="title"/>
+          </p:nvPr>
+        </p:nvSpPr>
+        <p:spPr/>
+        <p:txBody>
+          <a:bodyPr/>
+          <a:lstStyle/>
+          <a:p>
+            <a:r>
+              <a:rPr lang="es-MX" dirty="0" smtClean="0"/>
+              <a:t>Problemática</a:t>
+            </a:r>
+            <a:endParaRPr lang="es-MX" dirty="0"/>
+          </a:p>
+        </p:txBody>
+      </p:sp>
+      <p:sp>
+        <p:nvSpPr>
+          <p:cNvPr id="3" name="Marcador de contenido 2"/>
+          <p:cNvSpPr>
+            <a:spLocks noGrp="1"/>
+          </p:cNvSpPr>
+          <p:nvPr>
+            <p:ph idx="1"/>
+          </p:nvPr>
+        </p:nvSpPr>
+        <p:spPr>
+          <a:xfrm>
+            <a:off x="546277" y="2125500"/>
+            <a:ext cx="10554574" cy="3636511"/>
+          </a:xfrm>
+        </p:spPr>
+        <p:txBody>
+          <a:bodyPr/>
+          <a:lstStyle/>
+          <a:p>
+            <a:pPr marL="0" indent="0">
+              <a:buNone/>
+            </a:pPr>
+            <a:r>
+              <a:rPr lang="es-MX" dirty="0" smtClean="0"/>
+              <a:t>La </a:t>
+            </a:r>
+            <a:r>
+              <a:rPr lang="es-MX" dirty="0"/>
+              <a:t>escasez de agua se puede definir como el punto en el que el consumo de los usuarios afecta al suministro o calidad del agua, de forma que la demanda no puede ser completamente satisfecha. Este termina siendo un problema cada vez más grave, al ser el agua muy importante para la supervivencia de todo ser vivo. </a:t>
+            </a:r>
+            <a:endParaRPr lang="es-MX" dirty="0"/>
+          </a:p>
+          <a:p>
+            <a:r>
+              <a:rPr lang="es-MX" dirty="0"/>
+              <a:t>Las consecuencias de este problema son las siguientes:</a:t>
+            </a:r>
+            <a:endParaRPr lang="es-MX" dirty="0"/>
+          </a:p>
+          <a:p>
+            <a:pPr fontAlgn="base"/>
+            <a:r>
+              <a:rPr lang="es-MX" dirty="0"/>
+              <a:t>Enfermedades</a:t>
+            </a:r>
+          </a:p>
+          <a:p>
+            <a:pPr fontAlgn="base"/>
+            <a:r>
+              <a:rPr lang="es-MX" dirty="0"/>
+              <a:t>Hambre</a:t>
+            </a:r>
+          </a:p>
+          <a:p>
+            <a:pPr fontAlgn="base"/>
+            <a:r>
+              <a:rPr lang="es-MX" dirty="0"/>
+              <a:t>Desaparición de especies vegetales</a:t>
+            </a:r>
+          </a:p>
+          <a:p>
+            <a:pPr fontAlgn="base"/>
+            <a:r>
+              <a:rPr lang="es-MX" dirty="0"/>
+              <a:t>Conflictos</a:t>
+            </a:r>
+          </a:p>
+          <a:p>
+            <a:endParaRPr lang="es-MX" dirty="0"/>
+          </a:p>
+        </p:txBody>
+      </p:sp>
+      <p:pic>
+        <p:nvPicPr>
+          <p:cNvPr id="1026" name="Picture 2" descr="https://lh5.googleusercontent.com/_ZZWf-gPafpooVqpeU1yDg2abxjjCUNl0pCx-equ9shWuA-UHmV97qGzGo4GAlwLHZ5f8ZZReoApwGkpNrAdAR8ZaslDTwTmlZbV7cT5PQKDIFfNKztDHH6leErvDgvi7BOlKcTaA7M"/>
+          <p:cNvPicPr>
+            <a:picLocks noChangeAspect="1" noChangeArrowheads="1"/>
+          </p:cNvPicPr>
+          <p:nvPr/>
+        </p:nvPicPr>
+        <p:blipFill>
+          <a:blip r:embed="rId2">
+            <a:extLst>
+              <a:ext uri="{28A0092B-C50C-407E-A947-70E740481C1C}">
+                <a14:useLocalDpi xmlns:a14="http://schemas.microsoft.com/office/drawing/2010/main" val="0"/>
+              </a:ext>
+            </a:extLst>
+          </a:blip>
+          <a:srcRect/>
+          <a:stretch>
+            <a:fillRect/>
+          </a:stretch>
+        </p:blipFill>
+        <p:spPr bwMode="auto">
+          <a:xfrm>
+            <a:off x="7812000" y="3573000"/>
+            <a:ext cx="4380000" cy="3285000"/>
+          </a:xfrm>
+          <a:prstGeom prst="rect">
+            <a:avLst/>
+          </a:prstGeom>
+          <a:noFill/>
+          <a:extLst>
+            <a:ext uri="{909E8E84-426E-40DD-AFC4-6F175D3DCCD1}">
+              <a14:hiddenFill xmlns:a14="http://schemas.microsoft.com/office/drawing/2010/main">
+                <a:solidFill>
+                  <a:srgbClr val="FFFFFF"/>
+                </a:solidFill>
+              </a14:hiddenFill>
+            </a:ext>
+          </a:extLst>
+        </p:spPr>
+      </p:pic>
+    </p:spTree>
+    <p:extLst>
+      <p:ext uri="{BB962C8B-B14F-4D97-AF65-F5344CB8AC3E}">
+        <p14:creationId xmlns:p14="http://schemas.microsoft.com/office/powerpoint/2010/main" val="2751132505"/>
       </p:ext>
     </p:extLst>
   </p:cSld>

</xml_diff>

<commit_message>
Se agrego solucion a pptx
</commit_message>
<xml_diff>
--- a/PresentacionSensoresAgua.pptx
+++ b/PresentacionSensoresAgua.pptx
@@ -8,6 +8,7 @@
     <p:sldId id="256" r:id="rId2"/>
     <p:sldId id="257" r:id="rId3"/>
     <p:sldId id="258" r:id="rId4"/>
+    <p:sldId id="259" r:id="rId5"/>
   </p:sldIdLst>
   <p:sldSz cx="12192000" cy="6858000"/>
   <p:notesSz cx="6858000" cy="9144000"/>
@@ -209,7 +210,7 @@
           <a:effectLst/>
           <a:extLst>
             <a:ext uri="{91240B29-F687-4f45-9708-019B960494DF}">
-              <a14:hiddenLine xmlns="" xmlns:a14="http://schemas.microsoft.com/office/drawing/2010/main" w="9525">
+              <a14:hiddenLine xmlns:a14="http://schemas.microsoft.com/office/drawing/2010/main" xmlns="" w="9525">
                 <a:solidFill>
                   <a:srgbClr val="000000"/>
                 </a:solidFill>
@@ -1731,7 +1732,7 @@
           <a:ln/>
           <a:extLst>
             <a:ext uri="{91240B29-F687-4f45-9708-019B960494DF}">
-              <a14:hiddenLine xmlns="" xmlns:a14="http://schemas.microsoft.com/office/drawing/2010/main" w="9525">
+              <a14:hiddenLine xmlns:a14="http://schemas.microsoft.com/office/drawing/2010/main" xmlns="" w="9525">
                 <a:solidFill>
                   <a:srgbClr val="000000"/>
                 </a:solidFill>
@@ -2006,7 +2007,7 @@
           <a:ln/>
           <a:extLst>
             <a:ext uri="{91240B29-F687-4f45-9708-019B960494DF}">
-              <a14:hiddenLine xmlns="" xmlns:a14="http://schemas.microsoft.com/office/drawing/2010/main" w="9525">
+              <a14:hiddenLine xmlns:a14="http://schemas.microsoft.com/office/drawing/2010/main" xmlns="" w="9525">
                 <a:solidFill>
                   <a:srgbClr val="000000"/>
                 </a:solidFill>
@@ -2289,7 +2290,7 @@
           <a:ln/>
           <a:extLst>
             <a:ext uri="{91240B29-F687-4f45-9708-019B960494DF}">
-              <a14:hiddenLine xmlns="" xmlns:a14="http://schemas.microsoft.com/office/drawing/2010/main" w="9525">
+              <a14:hiddenLine xmlns:a14="http://schemas.microsoft.com/office/drawing/2010/main" xmlns="" w="9525">
                 <a:solidFill>
                   <a:srgbClr val="000000"/>
                 </a:solidFill>
@@ -2915,7 +2916,7 @@
           <a:ln/>
           <a:extLst>
             <a:ext uri="{91240B29-F687-4f45-9708-019B960494DF}">
-              <a14:hiddenLine xmlns="" xmlns:a14="http://schemas.microsoft.com/office/drawing/2010/main" w="9525">
+              <a14:hiddenLine xmlns:a14="http://schemas.microsoft.com/office/drawing/2010/main" xmlns="" w="9525">
                 <a:solidFill>
                   <a:srgbClr val="000000"/>
                 </a:solidFill>
@@ -3254,7 +3255,7 @@
           <a:ln/>
           <a:extLst>
             <a:ext uri="{91240B29-F687-4f45-9708-019B960494DF}">
-              <a14:hiddenLine xmlns="" xmlns:a14="http://schemas.microsoft.com/office/drawing/2010/main" w="9525">
+              <a14:hiddenLine xmlns:a14="http://schemas.microsoft.com/office/drawing/2010/main" xmlns="" w="9525">
                 <a:solidFill>
                   <a:srgbClr val="000000"/>
                 </a:solidFill>
@@ -3731,7 +3732,7 @@
           <a:ln/>
           <a:extLst>
             <a:ext uri="{91240B29-F687-4f45-9708-019B960494DF}">
-              <a14:hiddenLine xmlns="" xmlns:a14="http://schemas.microsoft.com/office/drawing/2010/main" w="9525">
+              <a14:hiddenLine xmlns:a14="http://schemas.microsoft.com/office/drawing/2010/main" xmlns="" w="9525">
                 <a:solidFill>
                   <a:srgbClr val="000000"/>
                 </a:solidFill>
@@ -4160,7 +4161,7 @@
           <a:ln/>
           <a:extLst>
             <a:ext uri="{91240B29-F687-4f45-9708-019B960494DF}">
-              <a14:hiddenLine xmlns="" xmlns:a14="http://schemas.microsoft.com/office/drawing/2010/main" w="9525">
+              <a14:hiddenLine xmlns:a14="http://schemas.microsoft.com/office/drawing/2010/main" xmlns="" w="9525">
                 <a:solidFill>
                   <a:srgbClr val="000000"/>
                 </a:solidFill>
@@ -5407,7 +5408,7 @@
                 <a16:creationId xmlns:a16="http://schemas.microsoft.com/office/drawing/2014/main" id="{54047A07-72EC-41BC-A55F-C264F639FB20}"/>
               </a:ext>
               <a:ext uri="{C183D7F6-B498-43B3-948B-1728B52AA6E4}">
-                <adec:decorative xmlns:adec="http://schemas.microsoft.com/office/drawing/2017/decorative" xmlns="" val="1"/>
+                <adec:decorative xmlns:adec="http://schemas.microsoft.com/office/drawing/2017/decorative" val="1"/>
               </a:ext>
             </a:extLst>
           </p:cNvPr>
@@ -5669,10 +5670,6 @@
             </a:endParaRPr>
           </a:p>
           <a:p>
-            <a:r>
-              <a:rPr lang="es-MX" dirty="0"/>
-              <a:t/>
-            </a:r>
             <a:br>
               <a:rPr lang="es-MX" dirty="0"/>
             </a:br>
@@ -6024,10 +6021,9 @@
           <a:lstStyle/>
           <a:p>
             <a:r>
-              <a:rPr lang="es-MX" dirty="0" smtClean="0"/>
+              <a:rPr lang="es-MX" dirty="0"/>
               <a:t>Problemática</a:t>
             </a:r>
-            <a:endParaRPr lang="es-MX" dirty="0"/>
           </a:p>
         </p:txBody>
       </p:sp>
@@ -6055,21 +6051,15 @@
               <a:buNone/>
             </a:pPr>
             <a:r>
-              <a:rPr lang="es-MX" dirty="0" smtClean="0"/>
-              <a:t>La </a:t>
-            </a:r>
-            <a:r>
               <a:rPr lang="es-MX" dirty="0"/>
-              <a:t>escasez de agua se puede definir como el punto en el que el consumo de los usuarios afecta al suministro o calidad del agua, de forma que la demanda no puede ser completamente satisfecha. Este termina siendo un problema cada vez más grave, al ser el agua muy importante para la supervivencia de todo ser vivo. </a:t>
-            </a:r>
-            <a:endParaRPr lang="es-MX" dirty="0"/>
+              <a:t>La escasez de agua se puede definir como el punto en el que el consumo de los usuarios afecta al suministro o calidad del agua, de forma que la demanda no puede ser completamente satisfecha. Este termina siendo un problema cada vez más grave, al ser el agua muy importante para la supervivencia de todo ser vivo. </a:t>
+            </a:r>
           </a:p>
           <a:p>
             <a:r>
               <a:rPr lang="es-MX" dirty="0"/>
               <a:t>Las consecuencias de este problema son las siguientes:</a:t>
             </a:r>
-            <a:endParaRPr lang="es-MX" dirty="0"/>
           </a:p>
           <a:p>
             <a:pPr fontAlgn="base"/>
@@ -6149,6 +6139,195 @@
     <p:extLst>
       <p:ext uri="{BB962C8B-B14F-4D97-AF65-F5344CB8AC3E}">
         <p14:creationId xmlns:p14="http://schemas.microsoft.com/office/powerpoint/2010/main" val="2751132505"/>
+      </p:ext>
+    </p:extLst>
+  </p:cSld>
+  <p:clrMapOvr>
+    <a:masterClrMapping/>
+  </p:clrMapOvr>
+</p:sld>
+</file>
+
+<file path=ppt/slides/slide4.xml><?xml version="1.0" encoding="utf-8"?>
+<p:sld xmlns:a="http://schemas.openxmlformats.org/drawingml/2006/main" xmlns:r="http://schemas.openxmlformats.org/officeDocument/2006/relationships" xmlns:p="http://schemas.openxmlformats.org/presentationml/2006/main">
+  <p:cSld>
+    <p:spTree>
+      <p:nvGrpSpPr>
+        <p:cNvPr id="1" name=""/>
+        <p:cNvGrpSpPr/>
+        <p:nvPr/>
+      </p:nvGrpSpPr>
+      <p:grpSpPr>
+        <a:xfrm>
+          <a:off x="0" y="0"/>
+          <a:ext cx="0" cy="0"/>
+          <a:chOff x="0" y="0"/>
+          <a:chExt cx="0" cy="0"/>
+        </a:xfrm>
+      </p:grpSpPr>
+      <p:sp>
+        <p:nvSpPr>
+          <p:cNvPr id="2" name="Título 1">
+            <a:extLst>
+              <a:ext uri="{FF2B5EF4-FFF2-40B4-BE49-F238E27FC236}">
+                <a16:creationId xmlns:a16="http://schemas.microsoft.com/office/drawing/2014/main" id="{5863CFF9-4D27-4A17-8452-7D1D8744AD12}"/>
+              </a:ext>
+            </a:extLst>
+          </p:cNvPr>
+          <p:cNvSpPr>
+            <a:spLocks noGrp="1"/>
+          </p:cNvSpPr>
+          <p:nvPr>
+            <p:ph type="title"/>
+          </p:nvPr>
+        </p:nvSpPr>
+        <p:spPr/>
+        <p:txBody>
+          <a:bodyPr/>
+          <a:lstStyle/>
+          <a:p>
+            <a:r>
+              <a:rPr lang="es-MX" dirty="0"/>
+              <a:t>Solución </a:t>
+            </a:r>
+            <a:endParaRPr lang="es-ES" dirty="0"/>
+          </a:p>
+        </p:txBody>
+      </p:sp>
+      <p:sp>
+        <p:nvSpPr>
+          <p:cNvPr id="3" name="Marcador de contenido 2">
+            <a:extLst>
+              <a:ext uri="{FF2B5EF4-FFF2-40B4-BE49-F238E27FC236}">
+                <a16:creationId xmlns:a16="http://schemas.microsoft.com/office/drawing/2014/main" id="{A0F798EA-64C7-49F7-81D3-B04E86EFAA87}"/>
+              </a:ext>
+            </a:extLst>
+          </p:cNvPr>
+          <p:cNvSpPr>
+            <a:spLocks noGrp="1"/>
+          </p:cNvSpPr>
+          <p:nvPr>
+            <p:ph idx="1"/>
+          </p:nvPr>
+        </p:nvSpPr>
+        <p:spPr>
+          <a:xfrm>
+            <a:off x="695999" y="1417638"/>
+            <a:ext cx="10800000" cy="2898255"/>
+          </a:xfrm>
+        </p:spPr>
+        <p:txBody>
+          <a:bodyPr/>
+          <a:lstStyle/>
+          <a:p>
+            <a:r>
+              <a:rPr lang="es-ES" sz="1800" b="0" i="0" u="none" strike="noStrike" dirty="0">
+                <a:solidFill>
+                  <a:srgbClr val="FFFFFF"/>
+                </a:solidFill>
+                <a:effectLst/>
+                <a:latin typeface="Lato"/>
+              </a:rPr>
+              <a:t>Planeamos utilizar un sensor hidráulico el cual te permite conocer y controlar el flujo de agua que utilizas en un tiempo definido y conectarlo a una red de internet para que de esta manera puedas planear el tiempo que deseas estar en la regadera o los litros que planeas gastar.</a:t>
+            </a:r>
+            <a:endParaRPr lang="es-ES" dirty="0"/>
+          </a:p>
+        </p:txBody>
+      </p:sp>
+      <p:pic>
+        <p:nvPicPr>
+          <p:cNvPr id="1026" name="Picture 2" descr="Sensor de flujo de agua para Placa de desarrollo y microcontroladores">
+            <a:extLst>
+              <a:ext uri="{FF2B5EF4-FFF2-40B4-BE49-F238E27FC236}">
+                <a16:creationId xmlns:a16="http://schemas.microsoft.com/office/drawing/2014/main" id="{3AB8B2FE-1429-42A1-8924-22601C1B8796}"/>
+              </a:ext>
+            </a:extLst>
+          </p:cNvPr>
+          <p:cNvPicPr>
+            <a:picLocks noChangeAspect="1" noChangeArrowheads="1"/>
+          </p:cNvPicPr>
+          <p:nvPr/>
+        </p:nvPicPr>
+        <p:blipFill rotWithShape="1">
+          <a:blip r:embed="rId2">
+            <a:extLst>
+              <a:ext uri="{28A0092B-C50C-407E-A947-70E740481C1C}">
+                <a14:useLocalDpi xmlns:a14="http://schemas.microsoft.com/office/drawing/2010/main" val="0"/>
+              </a:ext>
+            </a:extLst>
+          </a:blip>
+          <a:srcRect t="19629" r="-618" b="19629"/>
+          <a:stretch/>
+        </p:blipFill>
+        <p:spPr bwMode="auto">
+          <a:xfrm>
+            <a:off x="695999" y="3428440"/>
+            <a:ext cx="5367000" cy="3240000"/>
+          </a:xfrm>
+          <a:prstGeom prst="rect">
+            <a:avLst/>
+          </a:prstGeom>
+          <a:noFill/>
+          <a:extLst>
+            <a:ext uri="{909E8E84-426E-40DD-AFC4-6F175D3DCCD1}">
+              <a14:hiddenFill xmlns:a14="http://schemas.microsoft.com/office/drawing/2010/main">
+                <a:solidFill>
+                  <a:srgbClr val="FFFFFF"/>
+                </a:solidFill>
+              </a14:hiddenFill>
+            </a:ext>
+          </a:extLst>
+        </p:spPr>
+      </p:pic>
+      <p:pic>
+        <p:nvPicPr>
+          <p:cNvPr id="1028" name="Picture 4" descr="América Móvil y Vodafone se unen para ofrecer servicios IoT globales">
+            <a:extLst>
+              <a:ext uri="{FF2B5EF4-FFF2-40B4-BE49-F238E27FC236}">
+                <a16:creationId xmlns:a16="http://schemas.microsoft.com/office/drawing/2014/main" id="{2635ABD2-D8D0-4117-959D-63DAFC1BCB5A}"/>
+              </a:ext>
+            </a:extLst>
+          </p:cNvPr>
+          <p:cNvPicPr>
+            <a:picLocks noChangeAspect="1" noChangeArrowheads="1"/>
+          </p:cNvPicPr>
+          <p:nvPr/>
+        </p:nvPicPr>
+        <p:blipFill rotWithShape="1">
+          <a:blip r:embed="rId3">
+            <a:extLst>
+              <a:ext uri="{28A0092B-C50C-407E-A947-70E740481C1C}">
+                <a14:useLocalDpi xmlns:a14="http://schemas.microsoft.com/office/drawing/2010/main" val="0"/>
+              </a:ext>
+            </a:extLst>
+          </a:blip>
+          <a:srcRect t="16" b="5511"/>
+          <a:stretch/>
+        </p:blipFill>
+        <p:spPr bwMode="auto">
+          <a:xfrm>
+            <a:off x="6828728" y="3428440"/>
+            <a:ext cx="5207271" cy="3240000"/>
+          </a:xfrm>
+          <a:prstGeom prst="rect">
+            <a:avLst/>
+          </a:prstGeom>
+          <a:noFill/>
+          <a:extLst>
+            <a:ext uri="{909E8E84-426E-40DD-AFC4-6F175D3DCCD1}">
+              <a14:hiddenFill xmlns:a14="http://schemas.microsoft.com/office/drawing/2010/main">
+                <a:solidFill>
+                  <a:srgbClr val="FFFFFF"/>
+                </a:solidFill>
+              </a14:hiddenFill>
+            </a:ext>
+          </a:extLst>
+        </p:spPr>
+      </p:pic>
+    </p:spTree>
+    <p:extLst>
+      <p:ext uri="{BB962C8B-B14F-4D97-AF65-F5344CB8AC3E}">
+        <p14:creationId xmlns:p14="http://schemas.microsoft.com/office/powerpoint/2010/main" val="731457052"/>
       </p:ext>
     </p:extLst>
   </p:cSld>

</xml_diff>

<commit_message>
Ya agregue a la presentacion y al documento de word la conclusion
</commit_message>
<xml_diff>
--- a/PresentacionSensoresAgua.pptx
+++ b/PresentacionSensoresAgua.pptx
@@ -9,6 +9,7 @@
     <p:sldId id="257" r:id="rId3"/>
     <p:sldId id="258" r:id="rId4"/>
     <p:sldId id="259" r:id="rId5"/>
+    <p:sldId id="260" r:id="rId6"/>
   </p:sldIdLst>
   <p:sldSz cx="12192000" cy="6858000"/>
   <p:notesSz cx="6858000" cy="9144000"/>
@@ -210,7 +211,7 @@
           <a:effectLst/>
           <a:extLst>
             <a:ext uri="{91240B29-F687-4f45-9708-019B960494DF}">
-              <a14:hiddenLine xmlns:a14="http://schemas.microsoft.com/office/drawing/2010/main" xmlns="" w="9525">
+              <a14:hiddenLine xmlns="" xmlns:a14="http://schemas.microsoft.com/office/drawing/2010/main" w="9525">
                 <a:solidFill>
                   <a:srgbClr val="000000"/>
                 </a:solidFill>
@@ -1732,7 +1733,7 @@
           <a:ln/>
           <a:extLst>
             <a:ext uri="{91240B29-F687-4f45-9708-019B960494DF}">
-              <a14:hiddenLine xmlns:a14="http://schemas.microsoft.com/office/drawing/2010/main" xmlns="" w="9525">
+              <a14:hiddenLine xmlns="" xmlns:a14="http://schemas.microsoft.com/office/drawing/2010/main" w="9525">
                 <a:solidFill>
                   <a:srgbClr val="000000"/>
                 </a:solidFill>
@@ -2007,7 +2008,7 @@
           <a:ln/>
           <a:extLst>
             <a:ext uri="{91240B29-F687-4f45-9708-019B960494DF}">
-              <a14:hiddenLine xmlns:a14="http://schemas.microsoft.com/office/drawing/2010/main" xmlns="" w="9525">
+              <a14:hiddenLine xmlns="" xmlns:a14="http://schemas.microsoft.com/office/drawing/2010/main" w="9525">
                 <a:solidFill>
                   <a:srgbClr val="000000"/>
                 </a:solidFill>
@@ -2290,7 +2291,7 @@
           <a:ln/>
           <a:extLst>
             <a:ext uri="{91240B29-F687-4f45-9708-019B960494DF}">
-              <a14:hiddenLine xmlns:a14="http://schemas.microsoft.com/office/drawing/2010/main" xmlns="" w="9525">
+              <a14:hiddenLine xmlns="" xmlns:a14="http://schemas.microsoft.com/office/drawing/2010/main" w="9525">
                 <a:solidFill>
                   <a:srgbClr val="000000"/>
                 </a:solidFill>
@@ -2916,7 +2917,7 @@
           <a:ln/>
           <a:extLst>
             <a:ext uri="{91240B29-F687-4f45-9708-019B960494DF}">
-              <a14:hiddenLine xmlns:a14="http://schemas.microsoft.com/office/drawing/2010/main" xmlns="" w="9525">
+              <a14:hiddenLine xmlns="" xmlns:a14="http://schemas.microsoft.com/office/drawing/2010/main" w="9525">
                 <a:solidFill>
                   <a:srgbClr val="000000"/>
                 </a:solidFill>
@@ -3255,7 +3256,7 @@
           <a:ln/>
           <a:extLst>
             <a:ext uri="{91240B29-F687-4f45-9708-019B960494DF}">
-              <a14:hiddenLine xmlns:a14="http://schemas.microsoft.com/office/drawing/2010/main" xmlns="" w="9525">
+              <a14:hiddenLine xmlns="" xmlns:a14="http://schemas.microsoft.com/office/drawing/2010/main" w="9525">
                 <a:solidFill>
                   <a:srgbClr val="000000"/>
                 </a:solidFill>
@@ -3732,7 +3733,7 @@
           <a:ln/>
           <a:extLst>
             <a:ext uri="{91240B29-F687-4f45-9708-019B960494DF}">
-              <a14:hiddenLine xmlns:a14="http://schemas.microsoft.com/office/drawing/2010/main" xmlns="" w="9525">
+              <a14:hiddenLine xmlns="" xmlns:a14="http://schemas.microsoft.com/office/drawing/2010/main" w="9525">
                 <a:solidFill>
                   <a:srgbClr val="000000"/>
                 </a:solidFill>
@@ -4161,7 +4162,7 @@
           <a:ln/>
           <a:extLst>
             <a:ext uri="{91240B29-F687-4f45-9708-019B960494DF}">
-              <a14:hiddenLine xmlns:a14="http://schemas.microsoft.com/office/drawing/2010/main" xmlns="" w="9525">
+              <a14:hiddenLine xmlns="" xmlns:a14="http://schemas.microsoft.com/office/drawing/2010/main" w="9525">
                 <a:solidFill>
                   <a:srgbClr val="000000"/>
                 </a:solidFill>
@@ -6337,6 +6338,295 @@
 </p:sld>
 </file>
 
+<file path=ppt/slides/slide5.xml><?xml version="1.0" encoding="utf-8"?>
+<p:sld xmlns:a="http://schemas.openxmlformats.org/drawingml/2006/main" xmlns:r="http://schemas.openxmlformats.org/officeDocument/2006/relationships" xmlns:p="http://schemas.openxmlformats.org/presentationml/2006/main">
+  <p:cSld>
+    <p:spTree>
+      <p:nvGrpSpPr>
+        <p:cNvPr id="1" name=""/>
+        <p:cNvGrpSpPr/>
+        <p:nvPr/>
+      </p:nvGrpSpPr>
+      <p:grpSpPr>
+        <a:xfrm>
+          <a:off x="0" y="0"/>
+          <a:ext cx="0" cy="0"/>
+          <a:chOff x="0" y="0"/>
+          <a:chExt cx="0" cy="0"/>
+        </a:xfrm>
+      </p:grpSpPr>
+      <p:sp>
+        <p:nvSpPr>
+          <p:cNvPr id="2" name="Título 1">
+            <a:extLst>
+              <a:ext uri="{FF2B5EF4-FFF2-40B4-BE49-F238E27FC236}">
+                <a16:creationId xmlns:a16="http://schemas.microsoft.com/office/drawing/2014/main" id="{C8EF406E-2B88-42B9-8FEE-EBEE88F72247}"/>
+              </a:ext>
+            </a:extLst>
+          </p:cNvPr>
+          <p:cNvSpPr>
+            <a:spLocks noGrp="1"/>
+          </p:cNvSpPr>
+          <p:nvPr>
+            <p:ph type="title"/>
+          </p:nvPr>
+        </p:nvSpPr>
+        <p:spPr/>
+        <p:txBody>
+          <a:bodyPr/>
+          <a:lstStyle/>
+          <a:p>
+            <a:r>
+              <a:rPr lang="es-MX" dirty="0"/>
+              <a:t>Conclusión</a:t>
+            </a:r>
+          </a:p>
+        </p:txBody>
+      </p:sp>
+      <p:sp>
+        <p:nvSpPr>
+          <p:cNvPr id="3" name="Marcador de contenido 2">
+            <a:extLst>
+              <a:ext uri="{FF2B5EF4-FFF2-40B4-BE49-F238E27FC236}">
+                <a16:creationId xmlns:a16="http://schemas.microsoft.com/office/drawing/2014/main" id="{D62396B6-064B-4DE3-947F-1616548C4349}"/>
+              </a:ext>
+            </a:extLst>
+          </p:cNvPr>
+          <p:cNvSpPr>
+            <a:spLocks noGrp="1"/>
+          </p:cNvSpPr>
+          <p:nvPr>
+            <p:ph idx="1"/>
+          </p:nvPr>
+        </p:nvSpPr>
+        <p:spPr>
+          <a:xfrm>
+            <a:off x="662362" y="1809000"/>
+            <a:ext cx="10554574" cy="3636511"/>
+          </a:xfrm>
+        </p:spPr>
+        <p:txBody>
+          <a:bodyPr/>
+          <a:lstStyle/>
+          <a:p>
+            <a:pPr algn="just" rtl="0">
+              <a:spcBef>
+                <a:spcPts val="0"/>
+              </a:spcBef>
+              <a:spcAft>
+                <a:spcPts val="0"/>
+              </a:spcAft>
+            </a:pPr>
+            <a:r>
+              <a:rPr lang="es-MX" sz="1800" b="0" i="0" u="none" strike="noStrike" dirty="0">
+                <a:solidFill>
+                  <a:srgbClr val="FFFFFF"/>
+                </a:solidFill>
+                <a:effectLst/>
+                <a:latin typeface="Arial" panose="020B0604020202020204" pitchFamily="34" charset="0"/>
+              </a:rPr>
+              <a:t>El internet de las cosas es útil si es aplicado de manera correcta no solamente que sea usado para comodidad. </a:t>
+            </a:r>
+          </a:p>
+          <a:p>
+            <a:pPr marL="0" indent="0" algn="just" rtl="0">
+              <a:spcBef>
+                <a:spcPts val="0"/>
+              </a:spcBef>
+              <a:spcAft>
+                <a:spcPts val="0"/>
+              </a:spcAft>
+              <a:buNone/>
+            </a:pPr>
+            <a:endParaRPr lang="es-MX" b="0" dirty="0">
+              <a:effectLst/>
+            </a:endParaRPr>
+          </a:p>
+          <a:p>
+            <a:pPr algn="just" rtl="0">
+              <a:spcBef>
+                <a:spcPts val="0"/>
+              </a:spcBef>
+              <a:spcAft>
+                <a:spcPts val="0"/>
+              </a:spcAft>
+            </a:pPr>
+            <a:r>
+              <a:rPr lang="es-MX" sz="1800" b="0" i="0" u="none" strike="noStrike" dirty="0">
+                <a:solidFill>
+                  <a:srgbClr val="FFFFFF"/>
+                </a:solidFill>
+                <a:effectLst/>
+                <a:latin typeface="Arial" panose="020B0604020202020204" pitchFamily="34" charset="0"/>
+              </a:rPr>
+              <a:t>Gracias a </a:t>
+            </a:r>
+            <a:r>
+              <a:rPr lang="es-MX" sz="1800" b="0" i="0" u="none" strike="noStrike" dirty="0" err="1">
+                <a:solidFill>
+                  <a:srgbClr val="FFFFFF"/>
+                </a:solidFill>
+                <a:effectLst/>
+                <a:latin typeface="Arial" panose="020B0604020202020204" pitchFamily="34" charset="0"/>
+              </a:rPr>
+              <a:t>proteus</a:t>
+            </a:r>
+            <a:r>
+              <a:rPr lang="es-MX" sz="1800" b="0" i="0" u="none" strike="noStrike" dirty="0">
+                <a:solidFill>
+                  <a:srgbClr val="FFFFFF"/>
+                </a:solidFill>
+                <a:effectLst/>
+                <a:latin typeface="Arial" panose="020B0604020202020204" pitchFamily="34" charset="0"/>
+              </a:rPr>
+              <a:t> pudimos ver como hacer un </a:t>
+            </a:r>
+            <a:r>
+              <a:rPr lang="es-MX" sz="1800" b="0" i="0" u="none" strike="noStrike" dirty="0" err="1">
+                <a:solidFill>
+                  <a:srgbClr val="FFFFFF"/>
+                </a:solidFill>
+                <a:effectLst/>
+                <a:latin typeface="Arial" panose="020B0604020202020204" pitchFamily="34" charset="0"/>
+              </a:rPr>
+              <a:t>arduino</a:t>
+            </a:r>
+            <a:r>
+              <a:rPr lang="es-MX" sz="1800" b="0" i="0" u="none" strike="noStrike" dirty="0">
+                <a:solidFill>
+                  <a:srgbClr val="FFFFFF"/>
+                </a:solidFill>
+                <a:effectLst/>
+                <a:latin typeface="Arial" panose="020B0604020202020204" pitchFamily="34" charset="0"/>
+              </a:rPr>
+              <a:t> para poder detectar cuánta agua se consume y con la ayuda de </a:t>
+            </a:r>
+            <a:r>
+              <a:rPr lang="es-MX" sz="1800" b="0" i="0" u="none" strike="noStrike" dirty="0" err="1">
+                <a:solidFill>
+                  <a:srgbClr val="FFFFFF"/>
+                </a:solidFill>
+                <a:effectLst/>
+                <a:latin typeface="Arial" panose="020B0604020202020204" pitchFamily="34" charset="0"/>
+              </a:rPr>
+              <a:t>github</a:t>
+            </a:r>
+            <a:r>
+              <a:rPr lang="es-MX" sz="1800" b="0" i="0" u="none" strike="noStrike" dirty="0">
+                <a:solidFill>
+                  <a:srgbClr val="FFFFFF"/>
+                </a:solidFill>
+                <a:effectLst/>
+                <a:latin typeface="Arial" panose="020B0604020202020204" pitchFamily="34" charset="0"/>
+              </a:rPr>
+              <a:t> pudimos compartir los archivos de manera fácil y eficiente.</a:t>
+            </a:r>
+            <a:endParaRPr lang="es-MX" b="0" dirty="0">
+              <a:effectLst/>
+            </a:endParaRPr>
+          </a:p>
+          <a:p>
+            <a:pPr algn="just" rtl="0">
+              <a:spcBef>
+                <a:spcPts val="0"/>
+              </a:spcBef>
+              <a:spcAft>
+                <a:spcPts val="0"/>
+              </a:spcAft>
+            </a:pPr>
+            <a:endParaRPr lang="es-MX" sz="1800" i="0" u="none" strike="noStrike" dirty="0">
+              <a:solidFill>
+                <a:srgbClr val="FFFFFF"/>
+              </a:solidFill>
+              <a:latin typeface="Arial" panose="020B0604020202020204" pitchFamily="34" charset="0"/>
+            </a:endParaRPr>
+          </a:p>
+          <a:p>
+            <a:pPr algn="just" rtl="0">
+              <a:spcBef>
+                <a:spcPts val="0"/>
+              </a:spcBef>
+              <a:spcAft>
+                <a:spcPts val="0"/>
+              </a:spcAft>
+            </a:pPr>
+            <a:r>
+              <a:rPr lang="es-MX" sz="1800" b="0" i="0" u="none" strike="noStrike" dirty="0">
+                <a:solidFill>
+                  <a:srgbClr val="FFFFFF"/>
+                </a:solidFill>
+                <a:effectLst/>
+                <a:latin typeface="Arial" panose="020B0604020202020204" pitchFamily="34" charset="0"/>
+              </a:rPr>
+              <a:t>Hay muchas cosas de las cuales podríamos aplicar internet de las cosas para poder hacer la vida cotidiana más eficiente y fácil lo único que tenemos que hacer es pensar cómo podemos innovar los objetos ya creados y cómo podemos ayudar a la humanidad con nuestra innovación.</a:t>
+            </a:r>
+            <a:br>
+              <a:rPr lang="es-MX" dirty="0"/>
+            </a:br>
+            <a:endParaRPr lang="es-MX" dirty="0"/>
+          </a:p>
+        </p:txBody>
+      </p:sp>
+      <p:pic>
+        <p:nvPicPr>
+          <p:cNvPr id="1026" name="Picture 2">
+            <a:extLst>
+              <a:ext uri="{FF2B5EF4-FFF2-40B4-BE49-F238E27FC236}">
+                <a16:creationId xmlns:a16="http://schemas.microsoft.com/office/drawing/2014/main" id="{913F1B80-C152-4E20-B638-0039A9B9D95D}"/>
+              </a:ext>
+            </a:extLst>
+          </p:cNvPr>
+          <p:cNvPicPr>
+            <a:picLocks noChangeAspect="1" noChangeArrowheads="1"/>
+          </p:cNvPicPr>
+          <p:nvPr/>
+        </p:nvPicPr>
+        <p:blipFill>
+          <a:blip r:embed="rId2" cstate="print">
+            <a:extLst>
+              <a:ext uri="{28A0092B-C50C-407E-A947-70E740481C1C}">
+                <a14:useLocalDpi xmlns:a14="http://schemas.microsoft.com/office/drawing/2010/main" val="0"/>
+              </a:ext>
+            </a:extLst>
+          </a:blip>
+          <a:srcRect/>
+          <a:stretch>
+            <a:fillRect/>
+          </a:stretch>
+        </p:blipFill>
+        <p:spPr bwMode="auto">
+          <a:xfrm>
+            <a:off x="9876000" y="4976251"/>
+            <a:ext cx="2316000" cy="1881750"/>
+          </a:xfrm>
+          <a:prstGeom prst="rect">
+            <a:avLst/>
+          </a:prstGeom>
+          <a:noFill/>
+          <a:extLst>
+            <a:ext uri="{909E8E84-426E-40DD-AFC4-6F175D3DCCD1}">
+              <a14:hiddenFill xmlns:a14="http://schemas.microsoft.com/office/drawing/2010/main">
+                <a:solidFill>
+                  <a:srgbClr val="FFFFFF"/>
+                </a:solidFill>
+              </a14:hiddenFill>
+            </a:ext>
+          </a:extLst>
+        </p:spPr>
+      </p:pic>
+    </p:spTree>
+    <p:extLst>
+      <p:ext uri="{BB962C8B-B14F-4D97-AF65-F5344CB8AC3E}">
+        <p14:creationId xmlns:p14="http://schemas.microsoft.com/office/powerpoint/2010/main" val="695210469"/>
+      </p:ext>
+    </p:extLst>
+  </p:cSld>
+  <p:clrMapOvr>
+    <a:masterClrMapping/>
+  </p:clrMapOvr>
+</p:sld>
+</file>
+
 <file path=ppt/theme/theme1.xml><?xml version="1.0" encoding="utf-8"?>
 <a:theme xmlns:a="http://schemas.openxmlformats.org/drawingml/2006/main" name="Citable">
   <a:themeElements>

</xml_diff>

<commit_message>
Se modificó archivo pptx y se añadió ejemplo de archivo proteus
</commit_message>
<xml_diff>
--- a/PresentacionSensoresAgua.pptx
+++ b/PresentacionSensoresAgua.pptx
@@ -10,6 +10,7 @@
     <p:sldId id="258" r:id="rId4"/>
     <p:sldId id="259" r:id="rId5"/>
     <p:sldId id="260" r:id="rId6"/>
+    <p:sldId id="261" r:id="rId7"/>
   </p:sldIdLst>
   <p:sldSz cx="12192000" cy="6858000"/>
   <p:notesSz cx="6858000" cy="9144000"/>
@@ -211,7 +212,7 @@
           <a:effectLst/>
           <a:extLst>
             <a:ext uri="{91240B29-F687-4f45-9708-019B960494DF}">
-              <a14:hiddenLine xmlns="" xmlns:a14="http://schemas.microsoft.com/office/drawing/2010/main" w="9525">
+              <a14:hiddenLine xmlns:a14="http://schemas.microsoft.com/office/drawing/2010/main" xmlns="" w="9525">
                 <a:solidFill>
                   <a:srgbClr val="000000"/>
                 </a:solidFill>
@@ -1733,7 +1734,7 @@
           <a:ln/>
           <a:extLst>
             <a:ext uri="{91240B29-F687-4f45-9708-019B960494DF}">
-              <a14:hiddenLine xmlns="" xmlns:a14="http://schemas.microsoft.com/office/drawing/2010/main" w="9525">
+              <a14:hiddenLine xmlns:a14="http://schemas.microsoft.com/office/drawing/2010/main" xmlns="" w="9525">
                 <a:solidFill>
                   <a:srgbClr val="000000"/>
                 </a:solidFill>
@@ -2008,7 +2009,7 @@
           <a:ln/>
           <a:extLst>
             <a:ext uri="{91240B29-F687-4f45-9708-019B960494DF}">
-              <a14:hiddenLine xmlns="" xmlns:a14="http://schemas.microsoft.com/office/drawing/2010/main" w="9525">
+              <a14:hiddenLine xmlns:a14="http://schemas.microsoft.com/office/drawing/2010/main" xmlns="" w="9525">
                 <a:solidFill>
                   <a:srgbClr val="000000"/>
                 </a:solidFill>
@@ -2291,7 +2292,7 @@
           <a:ln/>
           <a:extLst>
             <a:ext uri="{91240B29-F687-4f45-9708-019B960494DF}">
-              <a14:hiddenLine xmlns="" xmlns:a14="http://schemas.microsoft.com/office/drawing/2010/main" w="9525">
+              <a14:hiddenLine xmlns:a14="http://schemas.microsoft.com/office/drawing/2010/main" xmlns="" w="9525">
                 <a:solidFill>
                   <a:srgbClr val="000000"/>
                 </a:solidFill>
@@ -2917,7 +2918,7 @@
           <a:ln/>
           <a:extLst>
             <a:ext uri="{91240B29-F687-4f45-9708-019B960494DF}">
-              <a14:hiddenLine xmlns="" xmlns:a14="http://schemas.microsoft.com/office/drawing/2010/main" w="9525">
+              <a14:hiddenLine xmlns:a14="http://schemas.microsoft.com/office/drawing/2010/main" xmlns="" w="9525">
                 <a:solidFill>
                   <a:srgbClr val="000000"/>
                 </a:solidFill>
@@ -3256,7 +3257,7 @@
           <a:ln/>
           <a:extLst>
             <a:ext uri="{91240B29-F687-4f45-9708-019B960494DF}">
-              <a14:hiddenLine xmlns="" xmlns:a14="http://schemas.microsoft.com/office/drawing/2010/main" w="9525">
+              <a14:hiddenLine xmlns:a14="http://schemas.microsoft.com/office/drawing/2010/main" xmlns="" w="9525">
                 <a:solidFill>
                   <a:srgbClr val="000000"/>
                 </a:solidFill>
@@ -3733,7 +3734,7 @@
           <a:ln/>
           <a:extLst>
             <a:ext uri="{91240B29-F687-4f45-9708-019B960494DF}">
-              <a14:hiddenLine xmlns="" xmlns:a14="http://schemas.microsoft.com/office/drawing/2010/main" w="9525">
+              <a14:hiddenLine xmlns:a14="http://schemas.microsoft.com/office/drawing/2010/main" xmlns="" w="9525">
                 <a:solidFill>
                   <a:srgbClr val="000000"/>
                 </a:solidFill>
@@ -4162,7 +4163,7 @@
           <a:ln/>
           <a:extLst>
             <a:ext uri="{91240B29-F687-4f45-9708-019B960494DF}">
-              <a14:hiddenLine xmlns="" xmlns:a14="http://schemas.microsoft.com/office/drawing/2010/main" w="9525">
+              <a14:hiddenLine xmlns:a14="http://schemas.microsoft.com/office/drawing/2010/main" xmlns="" w="9525">
                 <a:solidFill>
                   <a:srgbClr val="000000"/>
                 </a:solidFill>
@@ -5406,10 +5407,10 @@
           <p:cNvPr id="11" name="Rectangle 8">
             <a:extLst>
               <a:ext uri="{FF2B5EF4-FFF2-40B4-BE49-F238E27FC236}">
-                <a16:creationId xmlns:a16="http://schemas.microsoft.com/office/drawing/2014/main" id="{54047A07-72EC-41BC-A55F-C264F639FB20}"/>
+                <a16:creationId xmlns:a16="http://schemas.microsoft.com/office/drawing/2014/main" xmlns="" id="{54047A07-72EC-41BC-A55F-C264F639FB20}"/>
               </a:ext>
               <a:ext uri="{C183D7F6-B498-43B3-948B-1728B52AA6E4}">
-                <adec:decorative xmlns:adec="http://schemas.microsoft.com/office/drawing/2017/decorative" val="1"/>
+                <adec:decorative xmlns:adec="http://schemas.microsoft.com/office/drawing/2017/decorative" xmlns="" val="1"/>
               </a:ext>
             </a:extLst>
           </p:cNvPr>
@@ -5419,7 +5420,7 @@
           <p:nvPr>
             <p:extLst>
               <p:ext uri="{386F3935-93C4-4BCD-93E2-E3B085C9AB24}">
-                <p16:designElem xmlns:p16="http://schemas.microsoft.com/office/powerpoint/2015/main" val="1"/>
+                <p16:designElem xmlns:p16="http://schemas.microsoft.com/office/powerpoint/2015/main" xmlns="" val="1"/>
               </p:ext>
             </p:extLst>
           </p:nvPr>
@@ -5466,7 +5467,7 @@
           <p:cNvPr id="4" name="Imagen 3" descr="Diagrama, Dibujo de ingeniería&#10;&#10;Descripción generada automáticamente">
             <a:extLst>
               <a:ext uri="{FF2B5EF4-FFF2-40B4-BE49-F238E27FC236}">
-                <a16:creationId xmlns:a16="http://schemas.microsoft.com/office/drawing/2014/main" id="{AF3C8F0B-DFD7-4317-B4A7-D01C61ECCBBF}"/>
+                <a16:creationId xmlns:a16="http://schemas.microsoft.com/office/drawing/2014/main" xmlns="" id="{AF3C8F0B-DFD7-4317-B4A7-D01C61ECCBBF}"/>
               </a:ext>
             </a:extLst>
           </p:cNvPr>
@@ -5671,6 +5672,10 @@
             </a:endParaRPr>
           </a:p>
           <a:p>
+            <a:r>
+              <a:rPr lang="es-MX" dirty="0"/>
+              <a:t/>
+            </a:r>
             <a:br>
               <a:rPr lang="es-MX" dirty="0"/>
             </a:br>
@@ -5851,7 +5856,7 @@
           <p:cNvPr id="2" name="Título 1">
             <a:extLst>
               <a:ext uri="{FF2B5EF4-FFF2-40B4-BE49-F238E27FC236}">
-                <a16:creationId xmlns:a16="http://schemas.microsoft.com/office/drawing/2014/main" id="{486EAAA6-226E-4716-8401-1514C7F74430}"/>
+                <a16:creationId xmlns:a16="http://schemas.microsoft.com/office/drawing/2014/main" xmlns="" id="{486EAAA6-226E-4716-8401-1514C7F74430}"/>
               </a:ext>
             </a:extLst>
           </p:cNvPr>
@@ -5886,7 +5891,7 @@
           <p:cNvPr id="3" name="Marcador de contenido 2">
             <a:extLst>
               <a:ext uri="{FF2B5EF4-FFF2-40B4-BE49-F238E27FC236}">
-                <a16:creationId xmlns:a16="http://schemas.microsoft.com/office/drawing/2014/main" id="{2629E7A5-7C32-4782-B14F-5B7B81393095}"/>
+                <a16:creationId xmlns:a16="http://schemas.microsoft.com/office/drawing/2014/main" xmlns="" id="{2629E7A5-7C32-4782-B14F-5B7B81393095}"/>
               </a:ext>
             </a:extLst>
           </p:cNvPr>
@@ -5943,7 +5948,7 @@
           <p:cNvPr id="6" name="Imagen 5" descr="Diagrama, Icono&#10;&#10;Descripción generada automáticamente">
             <a:extLst>
               <a:ext uri="{FF2B5EF4-FFF2-40B4-BE49-F238E27FC236}">
-                <a16:creationId xmlns:a16="http://schemas.microsoft.com/office/drawing/2014/main" id="{C1F50B84-B5C1-47B8-9F8D-9A2C5521562A}"/>
+                <a16:creationId xmlns:a16="http://schemas.microsoft.com/office/drawing/2014/main" xmlns="" id="{C1F50B84-B5C1-47B8-9F8D-9A2C5521562A}"/>
               </a:ext>
             </a:extLst>
           </p:cNvPr>
@@ -6171,7 +6176,7 @@
           <p:cNvPr id="2" name="Título 1">
             <a:extLst>
               <a:ext uri="{FF2B5EF4-FFF2-40B4-BE49-F238E27FC236}">
-                <a16:creationId xmlns:a16="http://schemas.microsoft.com/office/drawing/2014/main" id="{5863CFF9-4D27-4A17-8452-7D1D8744AD12}"/>
+                <a16:creationId xmlns:a16="http://schemas.microsoft.com/office/drawing/2014/main" xmlns="" id="{5863CFF9-4D27-4A17-8452-7D1D8744AD12}"/>
               </a:ext>
             </a:extLst>
           </p:cNvPr>
@@ -6200,7 +6205,7 @@
           <p:cNvPr id="3" name="Marcador de contenido 2">
             <a:extLst>
               <a:ext uri="{FF2B5EF4-FFF2-40B4-BE49-F238E27FC236}">
-                <a16:creationId xmlns:a16="http://schemas.microsoft.com/office/drawing/2014/main" id="{A0F798EA-64C7-49F7-81D3-B04E86EFAA87}"/>
+                <a16:creationId xmlns:a16="http://schemas.microsoft.com/office/drawing/2014/main" xmlns="" id="{A0F798EA-64C7-49F7-81D3-B04E86EFAA87}"/>
               </a:ext>
             </a:extLst>
           </p:cNvPr>
@@ -6240,7 +6245,7 @@
           <p:cNvPr id="1026" name="Picture 2" descr="Sensor de flujo de agua para Placa de desarrollo y microcontroladores">
             <a:extLst>
               <a:ext uri="{FF2B5EF4-FFF2-40B4-BE49-F238E27FC236}">
-                <a16:creationId xmlns:a16="http://schemas.microsoft.com/office/drawing/2014/main" id="{3AB8B2FE-1429-42A1-8924-22601C1B8796}"/>
+                <a16:creationId xmlns:a16="http://schemas.microsoft.com/office/drawing/2014/main" xmlns="" id="{3AB8B2FE-1429-42A1-8924-22601C1B8796}"/>
               </a:ext>
             </a:extLst>
           </p:cNvPr>
@@ -6285,7 +6290,7 @@
           <p:cNvPr id="1028" name="Picture 4" descr="América Móvil y Vodafone se unen para ofrecer servicios IoT globales">
             <a:extLst>
               <a:ext uri="{FF2B5EF4-FFF2-40B4-BE49-F238E27FC236}">
-                <a16:creationId xmlns:a16="http://schemas.microsoft.com/office/drawing/2014/main" id="{2635ABD2-D8D0-4117-959D-63DAFC1BCB5A}"/>
+                <a16:creationId xmlns:a16="http://schemas.microsoft.com/office/drawing/2014/main" xmlns="" id="{2635ABD2-D8D0-4117-959D-63DAFC1BCB5A}"/>
               </a:ext>
             </a:extLst>
           </p:cNvPr>
@@ -6360,7 +6365,7 @@
           <p:cNvPr id="2" name="Título 1">
             <a:extLst>
               <a:ext uri="{FF2B5EF4-FFF2-40B4-BE49-F238E27FC236}">
-                <a16:creationId xmlns:a16="http://schemas.microsoft.com/office/drawing/2014/main" id="{C8EF406E-2B88-42B9-8FEE-EBEE88F72247}"/>
+                <a16:creationId xmlns:a16="http://schemas.microsoft.com/office/drawing/2014/main" xmlns="" id="{C8EF406E-2B88-42B9-8FEE-EBEE88F72247}"/>
               </a:ext>
             </a:extLst>
           </p:cNvPr>
@@ -6388,7 +6393,7 @@
           <p:cNvPr id="3" name="Marcador de contenido 2">
             <a:extLst>
               <a:ext uri="{FF2B5EF4-FFF2-40B4-BE49-F238E27FC236}">
-                <a16:creationId xmlns:a16="http://schemas.microsoft.com/office/drawing/2014/main" id="{D62396B6-064B-4DE3-947F-1616548C4349}"/>
+                <a16:creationId xmlns:a16="http://schemas.microsoft.com/office/drawing/2014/main" xmlns="" id="{D62396B6-064B-4DE3-947F-1616548C4349}"/>
               </a:ext>
             </a:extLst>
           </p:cNvPr>
@@ -6560,6 +6565,10 @@
               </a:rPr>
               <a:t>Hay muchas cosas de las cuales podríamos aplicar internet de las cosas para poder hacer la vida cotidiana más eficiente y fácil lo único que tenemos que hacer es pensar cómo podemos innovar los objetos ya creados y cómo podemos ayudar a la humanidad con nuestra innovación.</a:t>
             </a:r>
+            <a:r>
+              <a:rPr lang="es-MX" dirty="0"/>
+              <a:t/>
+            </a:r>
             <a:br>
               <a:rPr lang="es-MX" dirty="0"/>
             </a:br>
@@ -6572,7 +6581,7 @@
           <p:cNvPr id="1026" name="Picture 2">
             <a:extLst>
               <a:ext uri="{FF2B5EF4-FFF2-40B4-BE49-F238E27FC236}">
-                <a16:creationId xmlns:a16="http://schemas.microsoft.com/office/drawing/2014/main" id="{913F1B80-C152-4E20-B638-0039A9B9D95D}"/>
+                <a16:creationId xmlns:a16="http://schemas.microsoft.com/office/drawing/2014/main" xmlns="" id="{913F1B80-C152-4E20-B638-0039A9B9D95D}"/>
               </a:ext>
             </a:extLst>
           </p:cNvPr>
@@ -6618,6 +6627,171 @@
     <p:extLst>
       <p:ext uri="{BB962C8B-B14F-4D97-AF65-F5344CB8AC3E}">
         <p14:creationId xmlns:p14="http://schemas.microsoft.com/office/powerpoint/2010/main" val="695210469"/>
+      </p:ext>
+    </p:extLst>
+  </p:cSld>
+  <p:clrMapOvr>
+    <a:masterClrMapping/>
+  </p:clrMapOvr>
+</p:sld>
+</file>
+
+<file path=ppt/slides/slide6.xml><?xml version="1.0" encoding="utf-8"?>
+<p:sld xmlns:a="http://schemas.openxmlformats.org/drawingml/2006/main" xmlns:r="http://schemas.openxmlformats.org/officeDocument/2006/relationships" xmlns:p="http://schemas.openxmlformats.org/presentationml/2006/main">
+  <p:cSld>
+    <p:spTree>
+      <p:nvGrpSpPr>
+        <p:cNvPr id="1" name=""/>
+        <p:cNvGrpSpPr/>
+        <p:nvPr/>
+      </p:nvGrpSpPr>
+      <p:grpSpPr>
+        <a:xfrm>
+          <a:off x="0" y="0"/>
+          <a:ext cx="0" cy="0"/>
+          <a:chOff x="0" y="0"/>
+          <a:chExt cx="0" cy="0"/>
+        </a:xfrm>
+      </p:grpSpPr>
+      <p:sp>
+        <p:nvSpPr>
+          <p:cNvPr id="6" name="Rectángulo 5"/>
+          <p:cNvSpPr/>
+          <p:nvPr/>
+        </p:nvSpPr>
+        <p:spPr>
+          <a:xfrm>
+            <a:off x="3201803" y="1988782"/>
+            <a:ext cx="5788393" cy="400110"/>
+          </a:xfrm>
+          <a:prstGeom prst="rect">
+            <a:avLst/>
+          </a:prstGeom>
+        </p:spPr>
+        <p:txBody>
+          <a:bodyPr wrap="square">
+            <a:spAutoFit/>
+          </a:bodyPr>
+          <a:lstStyle/>
+          <a:p>
+            <a:r>
+              <a:rPr lang="es-ES" sz="2000" b="1" dirty="0">
+                <a:solidFill>
+                  <a:srgbClr val="FFFFFF"/>
+                </a:solidFill>
+                <a:effectLst>
+                  <a:outerShdw blurRad="38100" dist="38100" dir="2700000" algn="tl">
+                    <a:srgbClr val="000000">
+                      <a:alpha val="43137"/>
+                    </a:srgbClr>
+                  </a:outerShdw>
+                </a:effectLst>
+                <a:latin typeface="Montserrat"/>
+              </a:rPr>
+              <a:t>Ahora, platicaremos sobre cómo trabajamos</a:t>
+            </a:r>
+            <a:r>
+              <a:rPr lang="es-ES" sz="2000" b="1" dirty="0" smtClean="0">
+                <a:solidFill>
+                  <a:srgbClr val="FFFFFF"/>
+                </a:solidFill>
+                <a:effectLst>
+                  <a:outerShdw blurRad="38100" dist="38100" dir="2700000" algn="tl">
+                    <a:srgbClr val="000000">
+                      <a:alpha val="43137"/>
+                    </a:srgbClr>
+                  </a:outerShdw>
+                </a:effectLst>
+                <a:latin typeface="Montserrat"/>
+              </a:rPr>
+              <a:t>...</a:t>
+            </a:r>
+            <a:endParaRPr lang="es-ES" sz="2000" b="1" dirty="0">
+              <a:effectLst>
+                <a:outerShdw blurRad="38100" dist="38100" dir="2700000" algn="tl">
+                  <a:srgbClr val="000000">
+                    <a:alpha val="43137"/>
+                  </a:srgbClr>
+                </a:outerShdw>
+              </a:effectLst>
+            </a:endParaRPr>
+          </a:p>
+        </p:txBody>
+      </p:sp>
+      <p:pic>
+        <p:nvPicPr>
+          <p:cNvPr id="7" name="Picture 2" descr="https://lh3.googleusercontent.com/CPB7Ymw-P-GuSEo38IMgpEVrRvxRFe1vTtByUM5lCCLlqqyKGfGa4mfNgrIzAWYhUmovGH8ZHJA0zueyEjSn6pj0re-fxAAohPWeTShf5QF-xZM2RAaAxTvEj9VzeTOjMlC4viNw4SI"/>
+          <p:cNvPicPr>
+            <a:picLocks noChangeAspect="1" noChangeArrowheads="1"/>
+          </p:cNvPicPr>
+          <p:nvPr/>
+        </p:nvPicPr>
+        <p:blipFill>
+          <a:blip r:embed="rId2">
+            <a:extLst>
+              <a:ext uri="{28A0092B-C50C-407E-A947-70E740481C1C}">
+                <a14:useLocalDpi xmlns:a14="http://schemas.microsoft.com/office/drawing/2010/main" val="0"/>
+              </a:ext>
+            </a:extLst>
+          </a:blip>
+          <a:srcRect/>
+          <a:stretch>
+            <a:fillRect/>
+          </a:stretch>
+        </p:blipFill>
+        <p:spPr bwMode="auto">
+          <a:xfrm>
+            <a:off x="3556361" y="2648681"/>
+            <a:ext cx="5079278" cy="3648906"/>
+          </a:xfrm>
+          <a:prstGeom prst="rect">
+            <a:avLst/>
+          </a:prstGeom>
+          <a:solidFill>
+            <a:srgbClr val="FFFFFF">
+              <a:shade val="85000"/>
+            </a:srgbClr>
+          </a:solidFill>
+          <a:ln w="88900" cap="sq">
+            <a:solidFill>
+              <a:srgbClr val="FFFFFF"/>
+            </a:solidFill>
+            <a:miter lim="800000"/>
+          </a:ln>
+          <a:effectLst>
+            <a:outerShdw blurRad="55000" dist="18000" dir="5400000" algn="tl" rotWithShape="0">
+              <a:srgbClr val="000000">
+                <a:alpha val="40000"/>
+              </a:srgbClr>
+            </a:outerShdw>
+          </a:effectLst>
+          <a:scene3d>
+            <a:camera prst="orthographicFront"/>
+            <a:lightRig rig="twoPt" dir="t">
+              <a:rot lat="0" lon="0" rev="7200000"/>
+            </a:lightRig>
+          </a:scene3d>
+          <a:sp3d>
+            <a:bevelT w="25400" h="19050"/>
+            <a:contourClr>
+              <a:srgbClr val="FFFFFF"/>
+            </a:contourClr>
+          </a:sp3d>
+          <a:extLst>
+            <a:ext uri="{909E8E84-426E-40DD-AFC4-6F175D3DCCD1}">
+              <a14:hiddenFill xmlns:a14="http://schemas.microsoft.com/office/drawing/2010/main">
+                <a:solidFill>
+                  <a:srgbClr val="FFFFFF"/>
+                </a:solidFill>
+              </a14:hiddenFill>
+            </a:ext>
+          </a:extLst>
+        </p:spPr>
+      </p:pic>
+    </p:spTree>
+    <p:extLst>
+      <p:ext uri="{BB962C8B-B14F-4D97-AF65-F5344CB8AC3E}">
+        <p14:creationId xmlns:p14="http://schemas.microsoft.com/office/powerpoint/2010/main" val="1042703846"/>
       </p:ext>
     </p:extLst>
   </p:cSld>

</xml_diff>